<commit_message>
Update HexaFrame Periodic Table.pptx
</commit_message>
<xml_diff>
--- a/HexaFrame Periodic Table.pptx
+++ b/HexaFrame Periodic Table.pptx
@@ -265,7 +265,7 @@
           <a:p>
             <a:fld id="{0EDB6C4C-962E-48E1-B6A9-81D762EABE89}" type="datetimeFigureOut">
               <a:rPr lang="en-GB" smtClean="0"/>
-              <a:t>04/11/2024</a:t>
+              <a:t>14/11/2024</a:t>
             </a:fld>
             <a:endParaRPr lang="en-GB"/>
           </a:p>
@@ -465,7 +465,7 @@
           <a:p>
             <a:fld id="{0EDB6C4C-962E-48E1-B6A9-81D762EABE89}" type="datetimeFigureOut">
               <a:rPr lang="en-GB" smtClean="0"/>
-              <a:t>04/11/2024</a:t>
+              <a:t>14/11/2024</a:t>
             </a:fld>
             <a:endParaRPr lang="en-GB"/>
           </a:p>
@@ -675,7 +675,7 @@
           <a:p>
             <a:fld id="{0EDB6C4C-962E-48E1-B6A9-81D762EABE89}" type="datetimeFigureOut">
               <a:rPr lang="en-GB" smtClean="0"/>
-              <a:t>04/11/2024</a:t>
+              <a:t>14/11/2024</a:t>
             </a:fld>
             <a:endParaRPr lang="en-GB"/>
           </a:p>
@@ -875,7 +875,7 @@
           <a:p>
             <a:fld id="{0EDB6C4C-962E-48E1-B6A9-81D762EABE89}" type="datetimeFigureOut">
               <a:rPr lang="en-GB" smtClean="0"/>
-              <a:t>04/11/2024</a:t>
+              <a:t>14/11/2024</a:t>
             </a:fld>
             <a:endParaRPr lang="en-GB"/>
           </a:p>
@@ -1151,7 +1151,7 @@
           <a:p>
             <a:fld id="{0EDB6C4C-962E-48E1-B6A9-81D762EABE89}" type="datetimeFigureOut">
               <a:rPr lang="en-GB" smtClean="0"/>
-              <a:t>04/11/2024</a:t>
+              <a:t>14/11/2024</a:t>
             </a:fld>
             <a:endParaRPr lang="en-GB"/>
           </a:p>
@@ -1419,7 +1419,7 @@
           <a:p>
             <a:fld id="{0EDB6C4C-962E-48E1-B6A9-81D762EABE89}" type="datetimeFigureOut">
               <a:rPr lang="en-GB" smtClean="0"/>
-              <a:t>04/11/2024</a:t>
+              <a:t>14/11/2024</a:t>
             </a:fld>
             <a:endParaRPr lang="en-GB"/>
           </a:p>
@@ -1834,7 +1834,7 @@
           <a:p>
             <a:fld id="{0EDB6C4C-962E-48E1-B6A9-81D762EABE89}" type="datetimeFigureOut">
               <a:rPr lang="en-GB" smtClean="0"/>
-              <a:t>04/11/2024</a:t>
+              <a:t>14/11/2024</a:t>
             </a:fld>
             <a:endParaRPr lang="en-GB"/>
           </a:p>
@@ -1976,7 +1976,7 @@
           <a:p>
             <a:fld id="{0EDB6C4C-962E-48E1-B6A9-81D762EABE89}" type="datetimeFigureOut">
               <a:rPr lang="en-GB" smtClean="0"/>
-              <a:t>04/11/2024</a:t>
+              <a:t>14/11/2024</a:t>
             </a:fld>
             <a:endParaRPr lang="en-GB"/>
           </a:p>
@@ -2089,7 +2089,7 @@
           <a:p>
             <a:fld id="{0EDB6C4C-962E-48E1-B6A9-81D762EABE89}" type="datetimeFigureOut">
               <a:rPr lang="en-GB" smtClean="0"/>
-              <a:t>04/11/2024</a:t>
+              <a:t>14/11/2024</a:t>
             </a:fld>
             <a:endParaRPr lang="en-GB"/>
           </a:p>
@@ -2402,7 +2402,7 @@
           <a:p>
             <a:fld id="{0EDB6C4C-962E-48E1-B6A9-81D762EABE89}" type="datetimeFigureOut">
               <a:rPr lang="en-GB" smtClean="0"/>
-              <a:t>04/11/2024</a:t>
+              <a:t>14/11/2024</a:t>
             </a:fld>
             <a:endParaRPr lang="en-GB"/>
           </a:p>
@@ -2691,7 +2691,7 @@
           <a:p>
             <a:fld id="{0EDB6C4C-962E-48E1-B6A9-81D762EABE89}" type="datetimeFigureOut">
               <a:rPr lang="en-GB" smtClean="0"/>
-              <a:t>04/11/2024</a:t>
+              <a:t>14/11/2024</a:t>
             </a:fld>
             <a:endParaRPr lang="en-GB"/>
           </a:p>
@@ -2934,7 +2934,7 @@
           <a:p>
             <a:fld id="{0EDB6C4C-962E-48E1-B6A9-81D762EABE89}" type="datetimeFigureOut">
               <a:rPr lang="en-GB" smtClean="0"/>
-              <a:t>04/11/2024</a:t>
+              <a:t>14/11/2024</a:t>
             </a:fld>
             <a:endParaRPr lang="en-GB"/>
           </a:p>
@@ -4202,10 +4202,10 @@
       </p:grpSpPr>
       <p:pic>
         <p:nvPicPr>
-          <p:cNvPr id="4" name="Picture 3" descr="A screenshot of a cellphone&#10;&#10;Description automatically generated">
-            <a:extLst>
-              <a:ext uri="{FF2B5EF4-FFF2-40B4-BE49-F238E27FC236}">
-                <a16:creationId xmlns:a16="http://schemas.microsoft.com/office/drawing/2014/main" id="{E7EE1352-C3B6-DDBC-6B47-592D5EFC6028}"/>
+          <p:cNvPr id="5" name="Picture 4" descr="A screenshot of a cellphone&#10;&#10;Description automatically generated">
+            <a:extLst>
+              <a:ext uri="{FF2B5EF4-FFF2-40B4-BE49-F238E27FC236}">
+                <a16:creationId xmlns:a16="http://schemas.microsoft.com/office/drawing/2014/main" id="{157DFB19-E082-5866-186B-172CD1113468}"/>
               </a:ext>
             </a:extLst>
           </p:cNvPr>
@@ -4286,7 +4286,7 @@
           <p:nvPr>
             <p:extLst>
               <p:ext uri="{D42A27DB-BD31-4B8C-83A1-F6EECF244321}">
-                <p14:modId xmlns:p14="http://schemas.microsoft.com/office/powerpoint/2010/main" val="1216439181"/>
+                <p14:modId xmlns:p14="http://schemas.microsoft.com/office/powerpoint/2010/main" val="4055152698"/>
               </p:ext>
             </p:extLst>
           </p:nvPr>
@@ -4330,7 +4330,27 @@
                     <a:bodyPr/>
                     <a:lstStyle/>
                     <a:p>
-                      <a:endParaRPr lang="en-GB"/>
+                      <a:r>
+                        <a:rPr lang="en-GB" dirty="0"/>
+                        <a:t>Quantum Numbers (QNs) and</a:t>
+                      </a:r>
+                      <a:r>
+                        <a:rPr lang="zh-TW" altLang="en-US" dirty="0"/>
+                        <a:t> </a:t>
+                      </a:r>
+                      <a:r>
+                        <a:rPr lang="en-GB" altLang="zh-TW" dirty="0"/>
+                        <a:t>other</a:t>
+                      </a:r>
+                      <a:r>
+                        <a:rPr lang="zh-TW" altLang="en-US" dirty="0"/>
+                        <a:t> </a:t>
+                      </a:r>
+                      <a:r>
+                        <a:rPr lang="en-GB" altLang="zh-TW" dirty="0"/>
+                        <a:t>info</a:t>
+                      </a:r>
+                      <a:endParaRPr lang="en-GB" dirty="0"/>
                     </a:p>
                   </a:txBody>
                   <a:tcPr/>
@@ -4341,15 +4361,10 @@
                     <a:lstStyle/>
                     <a:p>
                       <a:r>
-                        <a:rPr lang="en-GB" dirty="0"/>
-                        <a:t>Determine using</a:t>
+                        <a:rPr lang="en-GB" b="1" dirty="0"/>
+                        <a:t>Traditional Table</a:t>
                       </a:r>
-                    </a:p>
-                    <a:p>
-                      <a:r>
-                        <a:rPr lang="en-GB" dirty="0"/>
-                        <a:t>Existing table</a:t>
-                      </a:r>
+                      <a:endParaRPr lang="en-GB" dirty="0"/>
                     </a:p>
                   </a:txBody>
                   <a:tcPr/>
@@ -4360,15 +4375,14 @@
                     <a:lstStyle/>
                     <a:p>
                       <a:r>
-                        <a:rPr lang="en-GB" dirty="0"/>
-                        <a:t>Determine using</a:t>
+                        <a:rPr lang="en-GB" b="1" dirty="0" err="1"/>
+                        <a:t>HexaFrame</a:t>
                       </a:r>
-                    </a:p>
-                    <a:p>
                       <a:r>
-                        <a:rPr lang="en-GB" dirty="0"/>
-                        <a:t>New table</a:t>
+                        <a:rPr lang="en-GB" b="1" dirty="0"/>
+                        <a:t> Table</a:t>
                       </a:r>
+                      <a:endParaRPr lang="en-GB" dirty="0"/>
                     </a:p>
                   </a:txBody>
                   <a:tcPr/>
@@ -4387,7 +4401,7 @@
                     <a:p>
                       <a:r>
                         <a:rPr lang="en-GB" dirty="0"/>
-                        <a:t>Principal QN: n</a:t>
+                        <a:t>Principal QN (n)</a:t>
                       </a:r>
                     </a:p>
                   </a:txBody>
@@ -4439,7 +4453,7 @@
                     <a:p>
                       <a:r>
                         <a:rPr lang="en-GB" dirty="0"/>
-                        <a:t>Angular QN: l</a:t>
+                        <a:t>Angular QN (l)</a:t>
                       </a:r>
                     </a:p>
                   </a:txBody>
@@ -4497,7 +4511,7 @@
                     <a:p>
                       <a:r>
                         <a:rPr lang="en-GB" dirty="0"/>
-                        <a:t>Electron spin QN: </a:t>
+                        <a:t>Electron spin QN (</a:t>
                       </a:r>
                       <a:r>
                         <a:rPr lang="en-GB" dirty="0" err="1"/>
@@ -4507,7 +4521,10 @@
                         <a:rPr lang="en-GB" baseline="-25000" dirty="0" err="1"/>
                         <a:t>s</a:t>
                       </a:r>
-                      <a:endParaRPr lang="en-GB" dirty="0"/>
+                      <a:r>
+                        <a:rPr lang="en-GB" dirty="0"/>
+                        <a:t>)</a:t>
+                      </a:r>
                     </a:p>
                   </a:txBody>
                   <a:tcPr/>
@@ -4558,12 +4575,17 @@
                     <a:p>
                       <a:r>
                         <a:rPr lang="en-GB" dirty="0"/>
-                        <a:t>Magnetic QN: m</a:t>
+                        <a:t>Magnetic QN (m</a:t>
                       </a:r>
                       <a:r>
                         <a:rPr lang="en-GB" baseline="-25000" dirty="0"/>
                         <a:t>l</a:t>
                       </a:r>
+                      <a:r>
+                        <a:rPr lang="en-GB" dirty="0"/>
+                        <a:t>)</a:t>
+                      </a:r>
+                      <a:endParaRPr lang="en-GB" baseline="-25000" dirty="0"/>
                     </a:p>
                   </a:txBody>
                   <a:tcPr/>
@@ -4848,14 +4870,14 @@
           <p:nvPr>
             <p:extLst>
               <p:ext uri="{D42A27DB-BD31-4B8C-83A1-F6EECF244321}">
-                <p14:modId xmlns:p14="http://schemas.microsoft.com/office/powerpoint/2010/main" val="4049944286"/>
+                <p14:modId xmlns:p14="http://schemas.microsoft.com/office/powerpoint/2010/main" val="1752996810"/>
               </p:ext>
             </p:extLst>
           </p:nvPr>
         </p:nvGraphicFramePr>
         <p:xfrm>
           <a:off x="4184954" y="1661191"/>
-          <a:ext cx="7892647" cy="4023360"/>
+          <a:ext cx="7892647" cy="3749040"/>
         </p:xfrm>
         <a:graphic>
           <a:graphicData uri="http://schemas.openxmlformats.org/drawingml/2006/table">
@@ -4903,15 +4925,17 @@
                     <a:lstStyle/>
                     <a:p>
                       <a:r>
-                        <a:rPr lang="en-GB" dirty="0"/>
+                        <a:rPr lang="en-GB" b="1" dirty="0"/>
                         <a:t>Reflected in</a:t>
                       </a:r>
-                    </a:p>
-                    <a:p>
+                      <a:br>
+                        <a:rPr lang="en-GB" dirty="0"/>
+                      </a:br>
                       <a:r>
-                        <a:rPr lang="en-GB" dirty="0"/>
-                        <a:t>Existing table</a:t>
+                        <a:rPr lang="en-GB" b="1" dirty="0"/>
+                        <a:t>Traditional Table</a:t>
                       </a:r>
+                      <a:endParaRPr lang="en-GB" dirty="0"/>
                     </a:p>
                   </a:txBody>
                   <a:tcPr/>
@@ -4922,15 +4946,21 @@
                     <a:lstStyle/>
                     <a:p>
                       <a:r>
-                        <a:rPr lang="en-GB" dirty="0"/>
+                        <a:rPr lang="en-GB" b="1" dirty="0"/>
                         <a:t>Reflected in</a:t>
                       </a:r>
-                    </a:p>
-                    <a:p>
+                      <a:br>
+                        <a:rPr lang="en-GB" dirty="0"/>
+                      </a:br>
                       <a:r>
-                        <a:rPr lang="en-GB" dirty="0"/>
-                        <a:t>New table</a:t>
+                        <a:rPr lang="en-GB" b="1" dirty="0" err="1"/>
+                        <a:t>HexaFrame</a:t>
                       </a:r>
+                      <a:r>
+                        <a:rPr lang="en-GB" b="1" dirty="0"/>
+                        <a:t> Table</a:t>
+                      </a:r>
+                      <a:endParaRPr lang="en-GB" dirty="0"/>
                     </a:p>
                   </a:txBody>
                   <a:tcPr/>
@@ -4955,7 +4985,7 @@
                     <a:p>
                       <a:r>
                         <a:rPr lang="en-GB" dirty="0"/>
-                        <a:t>e.g. Rb → Sr → Y → Zr …</a:t>
+                        <a:t>e.g. Rb 37 → Sr 38 → Y 39…</a:t>
                       </a:r>
                     </a:p>
                   </a:txBody>
@@ -4967,7 +4997,16 @@
                     <a:lstStyle/>
                     <a:p>
                       <a:r>
-                        <a:rPr lang="en-GB" dirty="0"/>
+                        <a:rPr lang="en-GB" sz="1800" kern="1200" dirty="0">
+                          <a:solidFill>
+                            <a:schemeClr val="accent6">
+                              <a:lumMod val="75000"/>
+                            </a:schemeClr>
+                          </a:solidFill>
+                          <a:latin typeface="+mn-lt"/>
+                          <a:ea typeface="+mn-ea"/>
+                          <a:cs typeface="+mn-cs"/>
+                        </a:rPr>
                         <a:t>Yes</a:t>
                       </a:r>
                     </a:p>
@@ -4980,16 +5019,18 @@
                     <a:lstStyle/>
                     <a:p>
                       <a:r>
-                        <a:rPr lang="en-GB" dirty="0"/>
+                        <a:rPr lang="en-GB" sz="1800" kern="1200" dirty="0">
+                          <a:solidFill>
+                            <a:schemeClr val="accent6">
+                              <a:lumMod val="75000"/>
+                            </a:schemeClr>
+                          </a:solidFill>
+                          <a:latin typeface="+mn-lt"/>
+                          <a:ea typeface="+mn-ea"/>
+                          <a:cs typeface="+mn-cs"/>
+                        </a:rPr>
                         <a:t>Yes</a:t>
                       </a:r>
-                      <a:endParaRPr lang="en-GB" b="0" dirty="0">
-                        <a:solidFill>
-                          <a:schemeClr val="accent6">
-                            <a:lumMod val="75000"/>
-                          </a:schemeClr>
-                        </a:solidFill>
-                      </a:endParaRPr>
                     </a:p>
                   </a:txBody>
                   <a:tcPr/>
@@ -5008,7 +5049,7 @@
                     <a:p>
                       <a:r>
                         <a:rPr lang="en-GB" dirty="0"/>
-                        <a:t>Electron filling order of orbits</a:t>
+                        <a:t>Electron filling order of subshells</a:t>
                       </a:r>
                     </a:p>
                     <a:p>
@@ -5031,7 +5072,7 @@
                             <a:schemeClr val="tx1"/>
                           </a:solidFill>
                         </a:rPr>
-                        <a:t>Yes, but less intuitive</a:t>
+                        <a:t>Less intuitive</a:t>
                       </a:r>
                     </a:p>
                   </a:txBody>
@@ -5043,10 +5084,15 @@
                     <a:lstStyle/>
                     <a:p>
                       <a:r>
-                        <a:rPr lang="en-GB" dirty="0">
+                        <a:rPr lang="en-GB" sz="1800" kern="1200" dirty="0">
                           <a:solidFill>
-                            <a:schemeClr val="tx1"/>
+                            <a:schemeClr val="accent6">
+                              <a:lumMod val="75000"/>
+                            </a:schemeClr>
                           </a:solidFill>
+                          <a:latin typeface="+mn-lt"/>
+                          <a:ea typeface="+mn-ea"/>
+                          <a:cs typeface="+mn-cs"/>
                         </a:rPr>
                         <a:t>Yes</a:t>
                       </a:r>
@@ -5068,13 +5114,22 @@
                     <a:p>
                       <a:r>
                         <a:rPr lang="en-GB" dirty="0"/>
-                        <a:t>Magnetic QN of orbits are 1, 3, 5, 7, …</a:t>
+                        <a:t>No. of elements of block</a:t>
                       </a:r>
-                    </a:p>
-                    <a:p>
+                      <a:br>
+                        <a:rPr lang="en-GB" dirty="0"/>
+                      </a:br>
                       <a:r>
                         <a:rPr lang="en-GB" dirty="0"/>
-                        <a:t>(i.e. 2l + 1)</a:t>
+                        <a:t>(</a:t>
+                      </a:r>
+                      <a:r>
+                        <a:rPr lang="en-GB" dirty="0" err="1"/>
+                        <a:t>s:p:d:f</a:t>
+                      </a:r>
+                      <a:r>
+                        <a:rPr lang="en-GB" dirty="0"/>
+                        <a:t> = 1:3:5:7)</a:t>
                       </a:r>
                     </a:p>
                   </a:txBody>
@@ -5099,20 +5154,18 @@
                     <a:lstStyle/>
                     <a:p>
                       <a:r>
-                        <a:rPr lang="en-GB" dirty="0">
+                        <a:rPr lang="en-GB" sz="1800" kern="1200" dirty="0">
                           <a:solidFill>
-                            <a:schemeClr val="tx1"/>
+                            <a:schemeClr val="accent6">
+                              <a:lumMod val="75000"/>
+                            </a:schemeClr>
                           </a:solidFill>
+                          <a:latin typeface="+mn-lt"/>
+                          <a:ea typeface="+mn-ea"/>
+                          <a:cs typeface="+mn-cs"/>
                         </a:rPr>
                         <a:t>Yes</a:t>
                       </a:r>
-                      <a:endParaRPr lang="en-GB" dirty="0">
-                        <a:solidFill>
-                          <a:schemeClr val="accent6">
-                            <a:lumMod val="75000"/>
-                          </a:schemeClr>
-                        </a:solidFill>
-                      </a:endParaRPr>
                     </a:p>
                   </a:txBody>
                   <a:tcPr/>
@@ -5144,12 +5197,20 @@
                     <a:lstStyle/>
                     <a:p>
                       <a:r>
+                        <a:rPr lang="en-GB">
+                          <a:solidFill>
+                            <a:schemeClr val="tx1"/>
+                          </a:solidFill>
+                        </a:rPr>
+                        <a:t>Less </a:t>
+                      </a:r>
+                      <a:r>
                         <a:rPr lang="en-GB" dirty="0">
                           <a:solidFill>
                             <a:schemeClr val="tx1"/>
                           </a:solidFill>
                         </a:rPr>
-                        <a:t>Yes, but less intuitive</a:t>
+                        <a:t>intuitive</a:t>
                       </a:r>
                     </a:p>
                   </a:txBody>
@@ -5161,10 +5222,15 @@
                     <a:lstStyle/>
                     <a:p>
                       <a:r>
-                        <a:rPr lang="en-GB" dirty="0">
+                        <a:rPr lang="en-GB" sz="1800" kern="1200" dirty="0">
                           <a:solidFill>
-                            <a:schemeClr val="tx1"/>
+                            <a:schemeClr val="accent6">
+                              <a:lumMod val="75000"/>
+                            </a:schemeClr>
                           </a:solidFill>
+                          <a:latin typeface="+mn-lt"/>
+                          <a:ea typeface="+mn-ea"/>
+                          <a:cs typeface="+mn-cs"/>
                         </a:rPr>
                         <a:t>Yes</a:t>
                       </a:r>
@@ -5532,8 +5598,8 @@
         </p:nvSpPr>
         <p:spPr>
           <a:xfrm>
-            <a:off x="1101211" y="1779638"/>
-            <a:ext cx="9488130" cy="830997"/>
+            <a:off x="739261" y="1499256"/>
+            <a:ext cx="9488130" cy="1200329"/>
           </a:xfrm>
           <a:prstGeom prst="rect">
             <a:avLst/>
@@ -5562,8 +5628,62 @@
             </a:r>
             <a:endParaRPr lang="en-GB" sz="2400" dirty="0"/>
           </a:p>
-        </p:txBody>
-      </p:sp>
+          <a:p>
+            <a:pPr marL="342900" indent="-342900">
+              <a:buFontTx/>
+              <a:buChar char="-"/>
+            </a:pPr>
+            <a:r>
+              <a:rPr lang="en-GB" sz="2400" dirty="0"/>
+              <a:t>Traditional </a:t>
+            </a:r>
+            <a:r>
+              <a:rPr lang="en-GB" sz="2400" dirty="0" err="1"/>
+              <a:t>regtangular</a:t>
+            </a:r>
+            <a:r>
+              <a:rPr lang="en-GB" sz="2400" dirty="0"/>
+              <a:t> periodic table:</a:t>
+            </a:r>
+          </a:p>
+        </p:txBody>
+      </p:sp>
+      <p:pic>
+        <p:nvPicPr>
+          <p:cNvPr id="5" name="Picture 4" descr="A screenshot of a computer&#10;&#10;Description automatically generated">
+            <a:extLst>
+              <a:ext uri="{FF2B5EF4-FFF2-40B4-BE49-F238E27FC236}">
+                <a16:creationId xmlns:a16="http://schemas.microsoft.com/office/drawing/2014/main" id="{D45B52EE-34C0-1BF1-A712-58B2BF2C3A1E}"/>
+              </a:ext>
+            </a:extLst>
+          </p:cNvPr>
+          <p:cNvPicPr>
+            <a:picLocks noChangeAspect="1"/>
+          </p:cNvPicPr>
+          <p:nvPr/>
+        </p:nvPicPr>
+        <p:blipFill>
+          <a:blip r:embed="rId3">
+            <a:extLst>
+              <a:ext uri="{28A0092B-C50C-407E-A947-70E740481C1C}">
+                <a14:useLocalDpi xmlns:a14="http://schemas.microsoft.com/office/drawing/2010/main" val="0"/>
+              </a:ext>
+            </a:extLst>
+          </a:blip>
+          <a:stretch>
+            <a:fillRect/>
+          </a:stretch>
+        </p:blipFill>
+        <p:spPr>
+          <a:xfrm>
+            <a:off x="1022111" y="2699585"/>
+            <a:ext cx="6731679" cy="3933825"/>
+          </a:xfrm>
+          <a:prstGeom prst="rect">
+            <a:avLst/>
+          </a:prstGeom>
+        </p:spPr>
+      </p:pic>
     </p:spTree>
     <p:extLst>
       <p:ext uri="{BB962C8B-B14F-4D97-AF65-F5344CB8AC3E}">

</xml_diff>

<commit_message>
Updated powerpoint and PDF
</commit_message>
<xml_diff>
--- a/HexaFrame Periodic Table.pptx
+++ b/HexaFrame Periodic Table.pptx
@@ -5387,7 +5387,7 @@
           <p:nvPr>
             <p:extLst>
               <p:ext uri="{D42A27DB-BD31-4B8C-83A1-F6EECF244321}">
-                <p14:modId xmlns:p14="http://schemas.microsoft.com/office/powerpoint/2010/main" val="2270405432"/>
+                <p14:modId xmlns:p14="http://schemas.microsoft.com/office/powerpoint/2010/main" val="879302848"/>
               </p:ext>
             </p:extLst>
           </p:nvPr>
@@ -5442,9 +5442,10 @@
                     <a:lstStyle/>
                     <a:p>
                       <a:r>
-                        <a:rPr lang="en-GB" dirty="0"/>
-                        <a:t>Existing table</a:t>
+                        <a:rPr lang="en-GB" b="1" dirty="0"/>
+                        <a:t>Traditional Table</a:t>
                       </a:r>
+                      <a:endParaRPr lang="en-GB" dirty="0"/>
                     </a:p>
                   </a:txBody>
                   <a:tcPr/>
@@ -5455,9 +5456,14 @@
                     <a:lstStyle/>
                     <a:p>
                       <a:r>
-                        <a:rPr lang="en-GB" dirty="0"/>
-                        <a:t>New table</a:t>
+                        <a:rPr lang="en-GB" b="1" dirty="0" err="1"/>
+                        <a:t>HexaFrame</a:t>
                       </a:r>
+                      <a:r>
+                        <a:rPr lang="en-GB" b="1"/>
+                        <a:t> Table</a:t>
+                      </a:r>
+                      <a:endParaRPr lang="en-GB" dirty="0"/>
                     </a:p>
                   </a:txBody>
                   <a:tcPr/>
@@ -5571,7 +5577,12 @@
             <p:ph type="title"/>
           </p:nvPr>
         </p:nvSpPr>
-        <p:spPr/>
+        <p:spPr>
+          <a:xfrm>
+            <a:off x="838200" y="96574"/>
+            <a:ext cx="10515600" cy="1325563"/>
+          </a:xfrm>
+        </p:spPr>
         <p:txBody>
           <a:bodyPr/>
           <a:lstStyle/>
@@ -5598,7 +5609,7 @@
         </p:nvSpPr>
         <p:spPr>
           <a:xfrm>
-            <a:off x="739261" y="1499256"/>
+            <a:off x="748405" y="1257941"/>
             <a:ext cx="9488130" cy="1200329"/>
           </a:xfrm>
           <a:prstGeom prst="rect">
@@ -5618,13 +5629,42 @@
             </a:pPr>
             <a:r>
               <a:rPr lang="en-GB" sz="2400" dirty="0"/>
-              <a:t>Other possible form of periodic table: </a:t>
+              <a:t>Blog post: </a:t>
             </a:r>
             <a:r>
               <a:rPr lang="en-GB" sz="2400" dirty="0">
                 <a:hlinkClick r:id="rId2"/>
               </a:rPr>
-              <a:t>https://en.wikipedia.org/wiki/Types_of_periodic_tables</a:t>
+              <a:t>The </a:t>
+            </a:r>
+            <a:r>
+              <a:rPr lang="en-GB" sz="2400" dirty="0" err="1">
+                <a:hlinkClick r:id="rId2"/>
+              </a:rPr>
+              <a:t>HexaFrame</a:t>
+            </a:r>
+            <a:r>
+              <a:rPr lang="en-GB" sz="2400" dirty="0">
+                <a:hlinkClick r:id="rId2"/>
+              </a:rPr>
+              <a:t> Periodic Table</a:t>
+            </a:r>
+            <a:endParaRPr lang="en-GB" sz="2400" dirty="0"/>
+          </a:p>
+          <a:p>
+            <a:pPr marL="342900" indent="-342900">
+              <a:buFontTx/>
+              <a:buChar char="-"/>
+            </a:pPr>
+            <a:r>
+              <a:rPr lang="en-GB" sz="2400" dirty="0"/>
+              <a:t>Other possible form of periodic table: </a:t>
+            </a:r>
+            <a:r>
+              <a:rPr lang="en-GB" sz="2400" dirty="0">
+                <a:hlinkClick r:id="rId3"/>
+              </a:rPr>
+              <a:t>Wikipedia</a:t>
             </a:r>
             <a:endParaRPr lang="en-GB" sz="2400" dirty="0"/>
           </a:p>
@@ -5663,7 +5703,7 @@
           <p:nvPr/>
         </p:nvPicPr>
         <p:blipFill>
-          <a:blip r:embed="rId3">
+          <a:blip r:embed="rId4">
             <a:extLst>
               <a:ext uri="{28A0092B-C50C-407E-A947-70E740481C1C}">
                 <a14:useLocalDpi xmlns:a14="http://schemas.microsoft.com/office/drawing/2010/main" val="0"/>

</xml_diff>

<commit_message>
Silver -> Rhodium to avoid the excited state confusion
</commit_message>
<xml_diff>
--- a/HexaFrame Periodic Table.pptx
+++ b/HexaFrame Periodic Table.pptx
@@ -265,7 +265,7 @@
           <a:p>
             <a:fld id="{0EDB6C4C-962E-48E1-B6A9-81D762EABE89}" type="datetimeFigureOut">
               <a:rPr lang="en-GB" smtClean="0"/>
-              <a:t>14/11/2024</a:t>
+              <a:t>15/11/2024</a:t>
             </a:fld>
             <a:endParaRPr lang="en-GB"/>
           </a:p>
@@ -465,7 +465,7 @@
           <a:p>
             <a:fld id="{0EDB6C4C-962E-48E1-B6A9-81D762EABE89}" type="datetimeFigureOut">
               <a:rPr lang="en-GB" smtClean="0"/>
-              <a:t>14/11/2024</a:t>
+              <a:t>15/11/2024</a:t>
             </a:fld>
             <a:endParaRPr lang="en-GB"/>
           </a:p>
@@ -675,7 +675,7 @@
           <a:p>
             <a:fld id="{0EDB6C4C-962E-48E1-B6A9-81D762EABE89}" type="datetimeFigureOut">
               <a:rPr lang="en-GB" smtClean="0"/>
-              <a:t>14/11/2024</a:t>
+              <a:t>15/11/2024</a:t>
             </a:fld>
             <a:endParaRPr lang="en-GB"/>
           </a:p>
@@ -875,7 +875,7 @@
           <a:p>
             <a:fld id="{0EDB6C4C-962E-48E1-B6A9-81D762EABE89}" type="datetimeFigureOut">
               <a:rPr lang="en-GB" smtClean="0"/>
-              <a:t>14/11/2024</a:t>
+              <a:t>15/11/2024</a:t>
             </a:fld>
             <a:endParaRPr lang="en-GB"/>
           </a:p>
@@ -1151,7 +1151,7 @@
           <a:p>
             <a:fld id="{0EDB6C4C-962E-48E1-B6A9-81D762EABE89}" type="datetimeFigureOut">
               <a:rPr lang="en-GB" smtClean="0"/>
-              <a:t>14/11/2024</a:t>
+              <a:t>15/11/2024</a:t>
             </a:fld>
             <a:endParaRPr lang="en-GB"/>
           </a:p>
@@ -1419,7 +1419,7 @@
           <a:p>
             <a:fld id="{0EDB6C4C-962E-48E1-B6A9-81D762EABE89}" type="datetimeFigureOut">
               <a:rPr lang="en-GB" smtClean="0"/>
-              <a:t>14/11/2024</a:t>
+              <a:t>15/11/2024</a:t>
             </a:fld>
             <a:endParaRPr lang="en-GB"/>
           </a:p>
@@ -1834,7 +1834,7 @@
           <a:p>
             <a:fld id="{0EDB6C4C-962E-48E1-B6A9-81D762EABE89}" type="datetimeFigureOut">
               <a:rPr lang="en-GB" smtClean="0"/>
-              <a:t>14/11/2024</a:t>
+              <a:t>15/11/2024</a:t>
             </a:fld>
             <a:endParaRPr lang="en-GB"/>
           </a:p>
@@ -1976,7 +1976,7 @@
           <a:p>
             <a:fld id="{0EDB6C4C-962E-48E1-B6A9-81D762EABE89}" type="datetimeFigureOut">
               <a:rPr lang="en-GB" smtClean="0"/>
-              <a:t>14/11/2024</a:t>
+              <a:t>15/11/2024</a:t>
             </a:fld>
             <a:endParaRPr lang="en-GB"/>
           </a:p>
@@ -2089,7 +2089,7 @@
           <a:p>
             <a:fld id="{0EDB6C4C-962E-48E1-B6A9-81D762EABE89}" type="datetimeFigureOut">
               <a:rPr lang="en-GB" smtClean="0"/>
-              <a:t>14/11/2024</a:t>
+              <a:t>15/11/2024</a:t>
             </a:fld>
             <a:endParaRPr lang="en-GB"/>
           </a:p>
@@ -2402,7 +2402,7 @@
           <a:p>
             <a:fld id="{0EDB6C4C-962E-48E1-B6A9-81D762EABE89}" type="datetimeFigureOut">
               <a:rPr lang="en-GB" smtClean="0"/>
-              <a:t>14/11/2024</a:t>
+              <a:t>15/11/2024</a:t>
             </a:fld>
             <a:endParaRPr lang="en-GB"/>
           </a:p>
@@ -2691,7 +2691,7 @@
           <a:p>
             <a:fld id="{0EDB6C4C-962E-48E1-B6A9-81D762EABE89}" type="datetimeFigureOut">
               <a:rPr lang="en-GB" smtClean="0"/>
-              <a:t>14/11/2024</a:t>
+              <a:t>15/11/2024</a:t>
             </a:fld>
             <a:endParaRPr lang="en-GB"/>
           </a:p>
@@ -2934,7 +2934,7 @@
           <a:p>
             <a:fld id="{0EDB6C4C-962E-48E1-B6A9-81D762EABE89}" type="datetimeFigureOut">
               <a:rPr lang="en-GB" smtClean="0"/>
-              <a:t>14/11/2024</a:t>
+              <a:t>15/11/2024</a:t>
             </a:fld>
             <a:endParaRPr lang="en-GB"/>
           </a:p>
@@ -4202,10 +4202,10 @@
       </p:grpSpPr>
       <p:pic>
         <p:nvPicPr>
-          <p:cNvPr id="5" name="Picture 4" descr="A screenshot of a cellphone&#10;&#10;Description automatically generated">
-            <a:extLst>
-              <a:ext uri="{FF2B5EF4-FFF2-40B4-BE49-F238E27FC236}">
-                <a16:creationId xmlns:a16="http://schemas.microsoft.com/office/drawing/2014/main" id="{157DFB19-E082-5866-186B-172CD1113468}"/>
+          <p:cNvPr id="9" name="Picture 8" descr="A screenshot of a cellphone&#10;&#10;Description automatically generated">
+            <a:extLst>
+              <a:ext uri="{FF2B5EF4-FFF2-40B4-BE49-F238E27FC236}">
+                <a16:creationId xmlns:a16="http://schemas.microsoft.com/office/drawing/2014/main" id="{E370B9A7-C2CE-B261-D7DE-9F536AC7EBDF}"/>
               </a:ext>
             </a:extLst>
           </p:cNvPr>

</xml_diff>

<commit_message>
Removed the invisible scratches from image
</commit_message>
<xml_diff>
--- a/HexaFrame Periodic Table.pptx
+++ b/HexaFrame Periodic Table.pptx
@@ -4202,10 +4202,10 @@
       </p:grpSpPr>
       <p:pic>
         <p:nvPicPr>
-          <p:cNvPr id="9" name="Picture 8" descr="A screenshot of a cellphone&#10;&#10;Description automatically generated">
-            <a:extLst>
-              <a:ext uri="{FF2B5EF4-FFF2-40B4-BE49-F238E27FC236}">
-                <a16:creationId xmlns:a16="http://schemas.microsoft.com/office/drawing/2014/main" id="{E370B9A7-C2CE-B261-D7DE-9F536AC7EBDF}"/>
+          <p:cNvPr id="4" name="Picture 3" descr="A screenshot of a cellphone&#10;&#10;Description automatically generated">
+            <a:extLst>
+              <a:ext uri="{FF2B5EF4-FFF2-40B4-BE49-F238E27FC236}">
+                <a16:creationId xmlns:a16="http://schemas.microsoft.com/office/drawing/2014/main" id="{95ABBEC5-FA3C-4D88-4E82-48463276FA2C}"/>
               </a:ext>
             </a:extLst>
           </p:cNvPr>

</xml_diff>

<commit_message>
Added horizontal arrows to image 2.png
</commit_message>
<xml_diff>
--- a/HexaFrame Periodic Table.pptx
+++ b/HexaFrame Periodic Table.pptx
@@ -4786,10 +4786,10 @@
       </p:grpSpPr>
       <p:pic>
         <p:nvPicPr>
-          <p:cNvPr id="4" name="Picture 3" descr="A hexagons with numbers and letters&#10;&#10;Description automatically generated">
-            <a:extLst>
-              <a:ext uri="{FF2B5EF4-FFF2-40B4-BE49-F238E27FC236}">
-                <a16:creationId xmlns:a16="http://schemas.microsoft.com/office/drawing/2014/main" id="{C0F1AEC6-E426-236B-251D-10D4BA7E4D5C}"/>
+          <p:cNvPr id="5" name="Picture 4" descr="A hexagons with numbers and letters&#10;&#10;Description automatically generated">
+            <a:extLst>
+              <a:ext uri="{FF2B5EF4-FFF2-40B4-BE49-F238E27FC236}">
+                <a16:creationId xmlns:a16="http://schemas.microsoft.com/office/drawing/2014/main" id="{7E455637-BCA9-138A-C20B-9F9AE90C92CC}"/>
               </a:ext>
             </a:extLst>
           </p:cNvPr>

</xml_diff>

<commit_message>
updated traditional periodic table from Ag to Rh
</commit_message>
<xml_diff>
--- a/HexaFrame Periodic Table.pptx
+++ b/HexaFrame Periodic Table.pptx
@@ -4850,7 +4850,15 @@
           <a:p>
             <a:r>
               <a:rPr lang="en-GB" dirty="0"/>
-              <a:t>Pro: perform element number accounting easily</a:t>
+              <a:t>Pro</a:t>
+            </a:r>
+            <a:r>
+              <a:rPr lang="en-GB"/>
+              <a:t>: Perform </a:t>
+            </a:r>
+            <a:r>
+              <a:rPr lang="en-GB" dirty="0"/>
+              <a:t>element number accounting easily</a:t>
             </a:r>
           </a:p>
         </p:txBody>
@@ -5690,10 +5698,10 @@
       </p:sp>
       <p:pic>
         <p:nvPicPr>
-          <p:cNvPr id="5" name="Picture 4" descr="A screenshot of a computer&#10;&#10;Description automatically generated">
-            <a:extLst>
-              <a:ext uri="{FF2B5EF4-FFF2-40B4-BE49-F238E27FC236}">
-                <a16:creationId xmlns:a16="http://schemas.microsoft.com/office/drawing/2014/main" id="{D45B52EE-34C0-1BF1-A712-58B2BF2C3A1E}"/>
+          <p:cNvPr id="6" name="Picture 5" descr="A table of periodic table&#10;&#10;Description automatically generated">
+            <a:extLst>
+              <a:ext uri="{FF2B5EF4-FFF2-40B4-BE49-F238E27FC236}">
+                <a16:creationId xmlns:a16="http://schemas.microsoft.com/office/drawing/2014/main" id="{D31B9FBE-F4CB-6FA5-3614-27C21DE6D8AE}"/>
               </a:ext>
             </a:extLst>
           </p:cNvPr>
@@ -5716,8 +5724,8 @@
         </p:blipFill>
         <p:spPr>
           <a:xfrm>
-            <a:off x="1022111" y="2699585"/>
-            <a:ext cx="6731679" cy="3933825"/>
+            <a:off x="838200" y="2505253"/>
+            <a:ext cx="7448550" cy="4352747"/>
           </a:xfrm>
           <a:prstGeom prst="rect">
             <a:avLst/>

</xml_diff>